<commit_message>
visibilidade boolean --> string (0,1,2)
</commit_message>
<xml_diff>
--- a/_apresentações/modelo_negocio.pptx
+++ b/_apresentações/modelo_negocio.pptx
@@ -2740,7 +2740,7 @@
           <a:p>
             <a:fld id="{A59CCC90-DD18-45CE-9930-85E2190B6EB3}" type="datetimeFigureOut">
               <a:rPr lang="en-US" smtClean="0"/>
-              <a:t>12/3/2021</a:t>
+              <a:t>12/10/2021</a:t>
             </a:fld>
             <a:endParaRPr lang="en-US"/>
           </a:p>
@@ -4435,7 +4435,7 @@
           <a:p>
             <a:fld id="{7B2BFB5F-8F55-4037-8342-DBA37736C541}" type="datetime1">
               <a:rPr lang="pt-PT" smtClean="0"/>
-              <a:t>03/12/2021</a:t>
+              <a:t>10/12/2021</a:t>
             </a:fld>
             <a:endParaRPr lang="pt-PT"/>
           </a:p>
@@ -4635,7 +4635,7 @@
           <a:p>
             <a:fld id="{E88DAECE-19DC-4716-ACB9-133D8C1710C0}" type="datetime1">
               <a:rPr lang="pt-PT" smtClean="0"/>
-              <a:t>03/12/2021</a:t>
+              <a:t>10/12/2021</a:t>
             </a:fld>
             <a:endParaRPr lang="pt-PT"/>
           </a:p>
@@ -4845,7 +4845,7 @@
           <a:p>
             <a:fld id="{3126B636-9E32-4AEF-8D3D-FD0DB4968D19}" type="datetime1">
               <a:rPr lang="pt-PT" smtClean="0"/>
-              <a:t>03/12/2021</a:t>
+              <a:t>10/12/2021</a:t>
             </a:fld>
             <a:endParaRPr lang="pt-PT"/>
           </a:p>
@@ -5045,7 +5045,7 @@
           <a:p>
             <a:fld id="{75607C13-EF84-4BAF-858E-455D02510A9F}" type="datetime1">
               <a:rPr lang="pt-PT" smtClean="0"/>
-              <a:t>03/12/2021</a:t>
+              <a:t>10/12/2021</a:t>
             </a:fld>
             <a:endParaRPr lang="pt-PT"/>
           </a:p>
@@ -5321,7 +5321,7 @@
           <a:p>
             <a:fld id="{64BB17DF-5174-484A-B8E1-9D6AC6AFE7FD}" type="datetime1">
               <a:rPr lang="pt-PT" smtClean="0"/>
-              <a:t>03/12/2021</a:t>
+              <a:t>10/12/2021</a:t>
             </a:fld>
             <a:endParaRPr lang="pt-PT"/>
           </a:p>
@@ -5589,7 +5589,7 @@
           <a:p>
             <a:fld id="{A3C6A7FE-3508-4D9A-AB3E-37A53B7E80D8}" type="datetime1">
               <a:rPr lang="pt-PT" smtClean="0"/>
-              <a:t>03/12/2021</a:t>
+              <a:t>10/12/2021</a:t>
             </a:fld>
             <a:endParaRPr lang="pt-PT"/>
           </a:p>
@@ -6004,7 +6004,7 @@
           <a:p>
             <a:fld id="{DBC3BE71-E2F4-452C-BC14-F604DBAB02CB}" type="datetime1">
               <a:rPr lang="pt-PT" smtClean="0"/>
-              <a:t>03/12/2021</a:t>
+              <a:t>10/12/2021</a:t>
             </a:fld>
             <a:endParaRPr lang="pt-PT"/>
           </a:p>
@@ -6146,7 +6146,7 @@
           <a:p>
             <a:fld id="{16EE7CF8-E2C9-4EDF-91BD-12C54B596268}" type="datetime1">
               <a:rPr lang="pt-PT" smtClean="0"/>
-              <a:t>03/12/2021</a:t>
+              <a:t>10/12/2021</a:t>
             </a:fld>
             <a:endParaRPr lang="pt-PT"/>
           </a:p>
@@ -6259,7 +6259,7 @@
           <a:p>
             <a:fld id="{EB86D543-6D53-48E0-9647-8C8473FC00EB}" type="datetime1">
               <a:rPr lang="pt-PT" smtClean="0"/>
-              <a:t>03/12/2021</a:t>
+              <a:t>10/12/2021</a:t>
             </a:fld>
             <a:endParaRPr lang="pt-PT"/>
           </a:p>
@@ -6572,7 +6572,7 @@
           <a:p>
             <a:fld id="{6F927EA4-49A0-48A7-8D38-A660BF8D0961}" type="datetime1">
               <a:rPr lang="pt-PT" smtClean="0"/>
-              <a:t>03/12/2021</a:t>
+              <a:t>10/12/2021</a:t>
             </a:fld>
             <a:endParaRPr lang="pt-PT"/>
           </a:p>
@@ -6861,7 +6861,7 @@
           <a:p>
             <a:fld id="{72897C4C-3520-41E5-9678-9D542B992DBE}" type="datetime1">
               <a:rPr lang="pt-PT" smtClean="0"/>
-              <a:t>03/12/2021</a:t>
+              <a:t>10/12/2021</a:t>
             </a:fld>
             <a:endParaRPr lang="pt-PT"/>
           </a:p>
@@ -7104,7 +7104,7 @@
           <a:p>
             <a:fld id="{33E924EB-683F-4E34-A5D7-D4EBDFBAB650}" type="datetime1">
               <a:rPr lang="pt-PT" smtClean="0"/>
-              <a:t>03/12/2021</a:t>
+              <a:t>10/12/2021</a:t>
             </a:fld>
             <a:endParaRPr lang="pt-PT"/>
           </a:p>
@@ -9603,10 +9603,10 @@
       </p:sp>
       <p:sp>
         <p:nvSpPr>
-          <p:cNvPr id="12" name="Content Placeholder 2">
-            <a:extLst>
-              <a:ext uri="{FF2B5EF4-FFF2-40B4-BE49-F238E27FC236}">
-                <a16:creationId xmlns:a16="http://schemas.microsoft.com/office/drawing/2014/main" id="{5BE1D263-E32B-47FB-9F0B-2FDB69FD6528}"/>
+          <p:cNvPr id="10" name="Content Placeholder 2">
+            <a:extLst>
+              <a:ext uri="{FF2B5EF4-FFF2-40B4-BE49-F238E27FC236}">
+                <a16:creationId xmlns:a16="http://schemas.microsoft.com/office/drawing/2014/main" id="{5DCC8A81-B2FA-4A16-A462-FC97D0AAE45A}"/>
               </a:ext>
             </a:extLst>
           </p:cNvPr>
@@ -9619,8 +9619,8 @@
         </p:nvSpPr>
         <p:spPr>
           <a:xfrm>
-            <a:off x="827434" y="2305050"/>
-            <a:ext cx="10168128" cy="3851282"/>
+            <a:off x="887500" y="2246158"/>
+            <a:ext cx="4483705" cy="4384490"/>
           </a:xfrm>
         </p:spPr>
         <p:txBody>
@@ -9628,6 +9628,31 @@
             <a:normAutofit/>
           </a:bodyPr>
           <a:lstStyle/>
+          <a:p>
+            <a:pPr marL="0" indent="0" algn="ctr">
+              <a:lnSpc>
+                <a:spcPct val="150000"/>
+              </a:lnSpc>
+              <a:buNone/>
+            </a:pPr>
+            <a:r>
+              <a:rPr lang="pt-PT" sz="2200" b="1" dirty="0">
+                <a:latin typeface="+mj-lt"/>
+              </a:rPr>
+              <a:t>FONTES DE RENDIMENTO</a:t>
+            </a:r>
+          </a:p>
+          <a:p>
+            <a:pPr marL="0" indent="0" algn="ctr">
+              <a:lnSpc>
+                <a:spcPct val="150000"/>
+              </a:lnSpc>
+              <a:buNone/>
+            </a:pPr>
+            <a:endParaRPr lang="pt-PT" sz="100" b="1" dirty="0">
+              <a:latin typeface="+mj-lt"/>
+            </a:endParaRPr>
+          </a:p>
           <a:p>
             <a:pPr>
               <a:lnSpc>
@@ -9638,35 +9663,15 @@
               <a:rPr lang="pt-BR" sz="2200" dirty="0">
                 <a:latin typeface="+mj-lt"/>
               </a:rPr>
-              <a:t>SaaS – alug</a:t>
+              <a:t>SaaS – aluguer mensal</a:t>
             </a:r>
-            <a:r>
-              <a:rPr lang="en-US" sz="2200" dirty="0" err="1">
-                <a:latin typeface="+mj-lt"/>
-              </a:rPr>
-              <a:t>uer</a:t>
-            </a:r>
-            <a:r>
-              <a:rPr lang="en-US" sz="2200" dirty="0">
-                <a:latin typeface="+mj-lt"/>
-              </a:rPr>
-              <a:t> da </a:t>
-            </a:r>
-            <a:r>
-              <a:rPr lang="en-US" sz="2200" dirty="0" err="1">
-                <a:latin typeface="+mj-lt"/>
-              </a:rPr>
-              <a:t>aplicação</a:t>
-            </a:r>
-            <a:r>
-              <a:rPr lang="en-US" sz="2200" dirty="0">
-                <a:latin typeface="+mj-lt"/>
-              </a:rPr>
-              <a:t> por valor mensal</a:t>
-            </a:r>
-          </a:p>
-          <a:p>
-            <a:pPr lvl="1"/>
+          </a:p>
+          <a:p>
+            <a:pPr lvl="1">
+              <a:lnSpc>
+                <a:spcPct val="100000"/>
+              </a:lnSpc>
+            </a:pPr>
             <a:r>
               <a:rPr lang="pt-BR" sz="1800" dirty="0">
                 <a:latin typeface="+mj-lt"/>
@@ -9675,16 +9680,17 @@
             </a:r>
           </a:p>
           <a:p>
-            <a:pPr lvl="1"/>
+            <a:pPr lvl="1">
+              <a:lnSpc>
+                <a:spcPct val="100000"/>
+              </a:lnSpc>
+            </a:pPr>
             <a:r>
               <a:rPr lang="pt-BR" sz="1800" dirty="0">
                 <a:latin typeface="+mj-lt"/>
               </a:rPr>
               <a:t>Help desk</a:t>
             </a:r>
-            <a:endParaRPr lang="en-US" sz="1800" dirty="0">
-              <a:latin typeface="+mj-lt"/>
-            </a:endParaRPr>
           </a:p>
           <a:p>
             <a:pPr>
@@ -9693,10 +9699,10 @@
               </a:lnSpc>
             </a:pPr>
             <a:r>
-              <a:rPr lang="pt-PT" sz="2200" dirty="0">
+              <a:rPr lang="pt-BR" sz="2200" dirty="0">
                 <a:latin typeface="+mj-lt"/>
               </a:rPr>
-              <a:t>Outras fontes de receita</a:t>
+              <a:t>Outras</a:t>
             </a:r>
           </a:p>
           <a:p>
@@ -9706,10 +9712,10 @@
               </a:lnSpc>
             </a:pPr>
             <a:r>
-              <a:rPr lang="pt-PT" sz="1800" dirty="0">
+              <a:rPr lang="pt-BR" sz="1800" dirty="0">
                 <a:latin typeface="+mj-lt"/>
               </a:rPr>
-              <a:t>Implementação de novas funcionalidades</a:t>
+              <a:t>Novas funcionalidades</a:t>
             </a:r>
           </a:p>
           <a:p>
@@ -9719,7 +9725,7 @@
               </a:lnSpc>
             </a:pPr>
             <a:r>
-              <a:rPr lang="pt-PT" sz="1800" dirty="0">
+              <a:rPr lang="pt-BR" sz="1800" dirty="0">
                 <a:latin typeface="+mj-lt"/>
               </a:rPr>
               <a:t>Pacotes de horas adicionais</a:t>
@@ -9732,20 +9738,939 @@
               </a:lnSpc>
             </a:pPr>
             <a:r>
-              <a:rPr lang="pt-PT" sz="1800" dirty="0" err="1">
+              <a:rPr lang="pt-BR" sz="1800" dirty="0">
                 <a:latin typeface="+mj-lt"/>
               </a:rPr>
-              <a:t>Host</a:t>
+              <a:t>Host da aplicação</a:t>
+            </a:r>
+          </a:p>
+        </p:txBody>
+      </p:sp>
+      <p:sp>
+        <p:nvSpPr>
+          <p:cNvPr id="16" name="Content Placeholder 2">
+            <a:extLst>
+              <a:ext uri="{FF2B5EF4-FFF2-40B4-BE49-F238E27FC236}">
+                <a16:creationId xmlns:a16="http://schemas.microsoft.com/office/drawing/2014/main" id="{468BBFD2-FF35-4473-9A76-E2BA328AB4EF}"/>
+              </a:ext>
+            </a:extLst>
+          </p:cNvPr>
+          <p:cNvSpPr txBox="1">
+            <a:spLocks/>
+          </p:cNvSpPr>
+          <p:nvPr/>
+        </p:nvSpPr>
+        <p:spPr>
+          <a:xfrm>
+            <a:off x="5926244" y="2249518"/>
+            <a:ext cx="4483705" cy="4384490"/>
+          </a:xfrm>
+          <a:prstGeom prst="rect">
+            <a:avLst/>
+          </a:prstGeom>
+        </p:spPr>
+        <p:txBody>
+          <a:bodyPr vert="horz" lIns="91440" tIns="45720" rIns="91440" bIns="45720" rtlCol="0">
+            <a:normAutofit/>
+          </a:bodyPr>
+          <a:lstStyle>
+            <a:lvl1pPr marL="228600" indent="-228600" algn="l" defTabSz="914400" rtl="0" eaLnBrk="1" latinLnBrk="0" hangingPunct="1">
+              <a:lnSpc>
+                <a:spcPct val="90000"/>
+              </a:lnSpc>
+              <a:spcBef>
+                <a:spcPts val="1000"/>
+              </a:spcBef>
+              <a:buFont typeface="Arial" panose="020B0604020202020204" pitchFamily="34" charset="0"/>
+              <a:buChar char="•"/>
+              <a:defRPr sz="2800" kern="1200">
+                <a:solidFill>
+                  <a:schemeClr val="tx1"/>
+                </a:solidFill>
+                <a:latin typeface="+mn-lt"/>
+                <a:ea typeface="+mn-ea"/>
+                <a:cs typeface="+mn-cs"/>
+              </a:defRPr>
+            </a:lvl1pPr>
+            <a:lvl2pPr marL="685800" indent="-228600" algn="l" defTabSz="914400" rtl="0" eaLnBrk="1" latinLnBrk="0" hangingPunct="1">
+              <a:lnSpc>
+                <a:spcPct val="90000"/>
+              </a:lnSpc>
+              <a:spcBef>
+                <a:spcPts val="500"/>
+              </a:spcBef>
+              <a:buFont typeface="Arial" panose="020B0604020202020204" pitchFamily="34" charset="0"/>
+              <a:buChar char="•"/>
+              <a:defRPr sz="2400" kern="1200">
+                <a:solidFill>
+                  <a:schemeClr val="tx1"/>
+                </a:solidFill>
+                <a:latin typeface="+mn-lt"/>
+                <a:ea typeface="+mn-ea"/>
+                <a:cs typeface="+mn-cs"/>
+              </a:defRPr>
+            </a:lvl2pPr>
+            <a:lvl3pPr marL="1143000" indent="-228600" algn="l" defTabSz="914400" rtl="0" eaLnBrk="1" latinLnBrk="0" hangingPunct="1">
+              <a:lnSpc>
+                <a:spcPct val="90000"/>
+              </a:lnSpc>
+              <a:spcBef>
+                <a:spcPts val="500"/>
+              </a:spcBef>
+              <a:buFont typeface="Arial" panose="020B0604020202020204" pitchFamily="34" charset="0"/>
+              <a:buChar char="•"/>
+              <a:defRPr sz="2000" kern="1200">
+                <a:solidFill>
+                  <a:schemeClr val="tx1"/>
+                </a:solidFill>
+                <a:latin typeface="+mn-lt"/>
+                <a:ea typeface="+mn-ea"/>
+                <a:cs typeface="+mn-cs"/>
+              </a:defRPr>
+            </a:lvl3pPr>
+            <a:lvl4pPr marL="1600200" indent="-228600" algn="l" defTabSz="914400" rtl="0" eaLnBrk="1" latinLnBrk="0" hangingPunct="1">
+              <a:lnSpc>
+                <a:spcPct val="90000"/>
+              </a:lnSpc>
+              <a:spcBef>
+                <a:spcPts val="500"/>
+              </a:spcBef>
+              <a:buFont typeface="Arial" panose="020B0604020202020204" pitchFamily="34" charset="0"/>
+              <a:buChar char="•"/>
+              <a:defRPr sz="1800" kern="1200">
+                <a:solidFill>
+                  <a:schemeClr val="tx1"/>
+                </a:solidFill>
+                <a:latin typeface="+mn-lt"/>
+                <a:ea typeface="+mn-ea"/>
+                <a:cs typeface="+mn-cs"/>
+              </a:defRPr>
+            </a:lvl4pPr>
+            <a:lvl5pPr marL="2057400" indent="-228600" algn="l" defTabSz="914400" rtl="0" eaLnBrk="1" latinLnBrk="0" hangingPunct="1">
+              <a:lnSpc>
+                <a:spcPct val="90000"/>
+              </a:lnSpc>
+              <a:spcBef>
+                <a:spcPts val="500"/>
+              </a:spcBef>
+              <a:buFont typeface="Arial" panose="020B0604020202020204" pitchFamily="34" charset="0"/>
+              <a:buChar char="•"/>
+              <a:defRPr sz="1800" kern="1200">
+                <a:solidFill>
+                  <a:schemeClr val="tx1"/>
+                </a:solidFill>
+                <a:latin typeface="+mn-lt"/>
+                <a:ea typeface="+mn-ea"/>
+                <a:cs typeface="+mn-cs"/>
+              </a:defRPr>
+            </a:lvl5pPr>
+            <a:lvl6pPr marL="2514600" indent="-228600" algn="l" defTabSz="914400" rtl="0" eaLnBrk="1" latinLnBrk="0" hangingPunct="1">
+              <a:lnSpc>
+                <a:spcPct val="90000"/>
+              </a:lnSpc>
+              <a:spcBef>
+                <a:spcPts val="500"/>
+              </a:spcBef>
+              <a:buFont typeface="Arial" panose="020B0604020202020204" pitchFamily="34" charset="0"/>
+              <a:buChar char="•"/>
+              <a:defRPr sz="1800" kern="1200">
+                <a:solidFill>
+                  <a:schemeClr val="tx1"/>
+                </a:solidFill>
+                <a:latin typeface="+mn-lt"/>
+                <a:ea typeface="+mn-ea"/>
+                <a:cs typeface="+mn-cs"/>
+              </a:defRPr>
+            </a:lvl6pPr>
+            <a:lvl7pPr marL="2971800" indent="-228600" algn="l" defTabSz="914400" rtl="0" eaLnBrk="1" latinLnBrk="0" hangingPunct="1">
+              <a:lnSpc>
+                <a:spcPct val="90000"/>
+              </a:lnSpc>
+              <a:spcBef>
+                <a:spcPts val="500"/>
+              </a:spcBef>
+              <a:buFont typeface="Arial" panose="020B0604020202020204" pitchFamily="34" charset="0"/>
+              <a:buChar char="•"/>
+              <a:defRPr sz="1800" kern="1200">
+                <a:solidFill>
+                  <a:schemeClr val="tx1"/>
+                </a:solidFill>
+                <a:latin typeface="+mn-lt"/>
+                <a:ea typeface="+mn-ea"/>
+                <a:cs typeface="+mn-cs"/>
+              </a:defRPr>
+            </a:lvl7pPr>
+            <a:lvl8pPr marL="3429000" indent="-228600" algn="l" defTabSz="914400" rtl="0" eaLnBrk="1" latinLnBrk="0" hangingPunct="1">
+              <a:lnSpc>
+                <a:spcPct val="90000"/>
+              </a:lnSpc>
+              <a:spcBef>
+                <a:spcPts val="500"/>
+              </a:spcBef>
+              <a:buFont typeface="Arial" panose="020B0604020202020204" pitchFamily="34" charset="0"/>
+              <a:buChar char="•"/>
+              <a:defRPr sz="1800" kern="1200">
+                <a:solidFill>
+                  <a:schemeClr val="tx1"/>
+                </a:solidFill>
+                <a:latin typeface="+mn-lt"/>
+                <a:ea typeface="+mn-ea"/>
+                <a:cs typeface="+mn-cs"/>
+              </a:defRPr>
+            </a:lvl8pPr>
+            <a:lvl9pPr marL="3886200" indent="-228600" algn="l" defTabSz="914400" rtl="0" eaLnBrk="1" latinLnBrk="0" hangingPunct="1">
+              <a:lnSpc>
+                <a:spcPct val="90000"/>
+              </a:lnSpc>
+              <a:spcBef>
+                <a:spcPts val="500"/>
+              </a:spcBef>
+              <a:buFont typeface="Arial" panose="020B0604020202020204" pitchFamily="34" charset="0"/>
+              <a:buChar char="•"/>
+              <a:defRPr sz="1800" kern="1200">
+                <a:solidFill>
+                  <a:schemeClr val="tx1"/>
+                </a:solidFill>
+                <a:latin typeface="+mn-lt"/>
+                <a:ea typeface="+mn-ea"/>
+                <a:cs typeface="+mn-cs"/>
+              </a:defRPr>
+            </a:lvl9pPr>
+          </a:lstStyle>
+          <a:p>
+            <a:pPr marL="0" indent="0" algn="ctr">
+              <a:lnSpc>
+                <a:spcPct val="150000"/>
+              </a:lnSpc>
+              <a:buFont typeface="Arial" panose="020B0604020202020204" pitchFamily="34" charset="0"/>
+              <a:buNone/>
+            </a:pPr>
+            <a:r>
+              <a:rPr lang="pt-PT" sz="2200" b="1" dirty="0">
+                <a:latin typeface="+mj-lt"/>
+              </a:rPr>
+              <a:t>CUSTOS</a:t>
+            </a:r>
+          </a:p>
+          <a:p>
+            <a:pPr marL="0" indent="0" algn="ctr">
+              <a:lnSpc>
+                <a:spcPct val="150000"/>
+              </a:lnSpc>
+              <a:buFont typeface="Arial" panose="020B0604020202020204" pitchFamily="34" charset="0"/>
+              <a:buNone/>
+            </a:pPr>
+            <a:endParaRPr lang="pt-PT" sz="100" b="1" dirty="0">
+              <a:latin typeface="+mj-lt"/>
+            </a:endParaRPr>
+          </a:p>
+          <a:p>
+            <a:pPr>
+              <a:lnSpc>
+                <a:spcPct val="100000"/>
+              </a:lnSpc>
+            </a:pPr>
+            <a:r>
+              <a:rPr lang="pt-BR" sz="2200" dirty="0">
+                <a:latin typeface="+mj-lt"/>
+              </a:rPr>
+              <a:t>Manutenção dos servidores</a:t>
+            </a:r>
+          </a:p>
+          <a:p>
+            <a:pPr lvl="1">
+              <a:lnSpc>
+                <a:spcPct val="100000"/>
+              </a:lnSpc>
+            </a:pPr>
+            <a:r>
+              <a:rPr lang="pt-BR" sz="1800" dirty="0">
+                <a:latin typeface="+mj-lt"/>
+              </a:rPr>
+              <a:t>15</a:t>
             </a:r>
             <a:r>
               <a:rPr lang="pt-PT" sz="1800" dirty="0">
                 <a:latin typeface="+mj-lt"/>
               </a:rPr>
-              <a:t> da aplicação</a:t>
+              <a:t>€</a:t>
             </a:r>
-          </a:p>
-        </p:txBody>
-      </p:sp>
+            <a:r>
+              <a:rPr lang="pt-BR" sz="1800" dirty="0">
+                <a:latin typeface="+mj-lt"/>
+              </a:rPr>
+              <a:t>-60</a:t>
+            </a:r>
+            <a:r>
+              <a:rPr lang="pt-PT" sz="1800" dirty="0">
+                <a:latin typeface="+mj-lt"/>
+              </a:rPr>
+              <a:t>€ p/mês</a:t>
+            </a:r>
+            <a:endParaRPr lang="pt-BR" sz="1800" dirty="0">
+              <a:latin typeface="+mj-lt"/>
+            </a:endParaRPr>
+          </a:p>
+          <a:p>
+            <a:pPr>
+              <a:lnSpc>
+                <a:spcPct val="100000"/>
+              </a:lnSpc>
+            </a:pPr>
+            <a:r>
+              <a:rPr lang="pt-BR" sz="2200" dirty="0">
+                <a:latin typeface="+mj-lt"/>
+              </a:rPr>
+              <a:t>Pessoal</a:t>
+            </a:r>
+          </a:p>
+          <a:p>
+            <a:pPr lvl="1">
+              <a:lnSpc>
+                <a:spcPct val="100000"/>
+              </a:lnSpc>
+            </a:pPr>
+            <a:r>
+              <a:rPr lang="pt-BR" sz="1800" dirty="0">
+                <a:latin typeface="+mj-lt"/>
+              </a:rPr>
+              <a:t>Apoio ao cliente</a:t>
+            </a:r>
+          </a:p>
+          <a:p>
+            <a:pPr lvl="1">
+              <a:lnSpc>
+                <a:spcPct val="100000"/>
+              </a:lnSpc>
+            </a:pPr>
+            <a:r>
+              <a:rPr lang="pt-BR" sz="1800" dirty="0">
+                <a:latin typeface="+mj-lt"/>
+              </a:rPr>
+              <a:t>Alterações ao código</a:t>
+            </a:r>
+            <a:endParaRPr lang="pt-BR" sz="1400" dirty="0">
+              <a:latin typeface="+mj-lt"/>
+            </a:endParaRPr>
+          </a:p>
+        </p:txBody>
+      </p:sp>
+      <p:cxnSp>
+        <p:nvCxnSpPr>
+          <p:cNvPr id="19" name="Conexão reta 18">
+            <a:extLst>
+              <a:ext uri="{FF2B5EF4-FFF2-40B4-BE49-F238E27FC236}">
+                <a16:creationId xmlns:a16="http://schemas.microsoft.com/office/drawing/2014/main" id="{CAB6D3A6-7186-4C94-BD0D-EBCE0E85550E}"/>
+              </a:ext>
+            </a:extLst>
+          </p:cNvPr>
+          <p:cNvCxnSpPr>
+            <a:cxnSpLocks/>
+          </p:cNvCxnSpPr>
+          <p:nvPr/>
+        </p:nvCxnSpPr>
+        <p:spPr>
+          <a:xfrm>
+            <a:off x="5371205" y="2375085"/>
+            <a:ext cx="0" cy="3282765"/>
+          </a:xfrm>
+          <a:prstGeom prst="line">
+            <a:avLst/>
+          </a:prstGeom>
+        </p:spPr>
+        <p:style>
+          <a:lnRef idx="1">
+            <a:schemeClr val="dk1"/>
+          </a:lnRef>
+          <a:fillRef idx="0">
+            <a:schemeClr val="dk1"/>
+          </a:fillRef>
+          <a:effectRef idx="0">
+            <a:schemeClr val="dk1"/>
+          </a:effectRef>
+          <a:fontRef idx="minor">
+            <a:schemeClr val="tx1"/>
+          </a:fontRef>
+        </p:style>
+      </p:cxnSp>
+      <p:sp>
+        <p:nvSpPr>
+          <p:cNvPr id="21" name="Retângulo 20">
+            <a:extLst>
+              <a:ext uri="{FF2B5EF4-FFF2-40B4-BE49-F238E27FC236}">
+                <a16:creationId xmlns:a16="http://schemas.microsoft.com/office/drawing/2014/main" id="{C4FD3897-7708-40D4-A8B0-E99968E03799}"/>
+              </a:ext>
+            </a:extLst>
+          </p:cNvPr>
+          <p:cNvSpPr/>
+          <p:nvPr/>
+        </p:nvSpPr>
+        <p:spPr>
+          <a:xfrm>
+            <a:off x="9686074" y="5393570"/>
+            <a:ext cx="428625" cy="876300"/>
+          </a:xfrm>
+          <a:prstGeom prst="rect">
+            <a:avLst/>
+          </a:prstGeom>
+          <a:ln>
+            <a:noFill/>
+          </a:ln>
+        </p:spPr>
+        <p:style>
+          <a:lnRef idx="2">
+            <a:schemeClr val="accent2">
+              <a:shade val="50000"/>
+            </a:schemeClr>
+          </a:lnRef>
+          <a:fillRef idx="1">
+            <a:schemeClr val="accent2"/>
+          </a:fillRef>
+          <a:effectRef idx="0">
+            <a:schemeClr val="accent2"/>
+          </a:effectRef>
+          <a:fontRef idx="minor">
+            <a:schemeClr val="lt1"/>
+          </a:fontRef>
+        </p:style>
+        <p:txBody>
+          <a:bodyPr rtlCol="0" anchor="ctr"/>
+          <a:lstStyle/>
+          <a:p>
+            <a:pPr algn="ctr"/>
+            <a:endParaRPr lang="en-US"/>
+          </a:p>
+        </p:txBody>
+      </p:sp>
+      <p:sp>
+        <p:nvSpPr>
+          <p:cNvPr id="28" name="Retângulo 27">
+            <a:extLst>
+              <a:ext uri="{FF2B5EF4-FFF2-40B4-BE49-F238E27FC236}">
+                <a16:creationId xmlns:a16="http://schemas.microsoft.com/office/drawing/2014/main" id="{3DB8555F-7BF6-464D-9F3C-0AE8B074291D}"/>
+              </a:ext>
+            </a:extLst>
+          </p:cNvPr>
+          <p:cNvSpPr/>
+          <p:nvPr/>
+        </p:nvSpPr>
+        <p:spPr>
+          <a:xfrm>
+            <a:off x="10248056" y="5184528"/>
+            <a:ext cx="428625" cy="1057275"/>
+          </a:xfrm>
+          <a:prstGeom prst="rect">
+            <a:avLst/>
+          </a:prstGeom>
+          <a:ln>
+            <a:noFill/>
+          </a:ln>
+        </p:spPr>
+        <p:style>
+          <a:lnRef idx="2">
+            <a:schemeClr val="accent3">
+              <a:shade val="50000"/>
+            </a:schemeClr>
+          </a:lnRef>
+          <a:fillRef idx="1">
+            <a:schemeClr val="accent3"/>
+          </a:fillRef>
+          <a:effectRef idx="0">
+            <a:schemeClr val="accent3"/>
+          </a:effectRef>
+          <a:fontRef idx="minor">
+            <a:schemeClr val="lt1"/>
+          </a:fontRef>
+        </p:style>
+        <p:txBody>
+          <a:bodyPr rtlCol="0" anchor="ctr"/>
+          <a:lstStyle/>
+          <a:p>
+            <a:pPr algn="ctr"/>
+            <a:endParaRPr lang="en-US" dirty="0"/>
+          </a:p>
+        </p:txBody>
+      </p:sp>
+      <p:sp>
+        <p:nvSpPr>
+          <p:cNvPr id="29" name="Retângulo 28">
+            <a:extLst>
+              <a:ext uri="{FF2B5EF4-FFF2-40B4-BE49-F238E27FC236}">
+                <a16:creationId xmlns:a16="http://schemas.microsoft.com/office/drawing/2014/main" id="{214D70F8-67A9-49AC-8A95-15DA325B1828}"/>
+              </a:ext>
+            </a:extLst>
+          </p:cNvPr>
+          <p:cNvSpPr/>
+          <p:nvPr/>
+        </p:nvSpPr>
+        <p:spPr>
+          <a:xfrm>
+            <a:off x="10798844" y="5359154"/>
+            <a:ext cx="428625" cy="876300"/>
+          </a:xfrm>
+          <a:prstGeom prst="rect">
+            <a:avLst/>
+          </a:prstGeom>
+          <a:solidFill>
+            <a:srgbClr val="E07070"/>
+          </a:solidFill>
+          <a:ln>
+            <a:noFill/>
+          </a:ln>
+        </p:spPr>
+        <p:style>
+          <a:lnRef idx="2">
+            <a:schemeClr val="accent1">
+              <a:shade val="50000"/>
+            </a:schemeClr>
+          </a:lnRef>
+          <a:fillRef idx="1">
+            <a:schemeClr val="accent1"/>
+          </a:fillRef>
+          <a:effectRef idx="0">
+            <a:schemeClr val="accent1"/>
+          </a:effectRef>
+          <a:fontRef idx="minor">
+            <a:schemeClr val="lt1"/>
+          </a:fontRef>
+        </p:style>
+        <p:txBody>
+          <a:bodyPr rtlCol="0" anchor="ctr"/>
+          <a:lstStyle/>
+          <a:p>
+            <a:pPr algn="ctr"/>
+            <a:endParaRPr lang="en-US"/>
+          </a:p>
+        </p:txBody>
+      </p:sp>
+      <p:sp>
+        <p:nvSpPr>
+          <p:cNvPr id="30" name="Retângulo 29">
+            <a:extLst>
+              <a:ext uri="{FF2B5EF4-FFF2-40B4-BE49-F238E27FC236}">
+                <a16:creationId xmlns:a16="http://schemas.microsoft.com/office/drawing/2014/main" id="{07FF5870-90A3-4BAC-B21A-CA77BBD4C937}"/>
+              </a:ext>
+            </a:extLst>
+          </p:cNvPr>
+          <p:cNvSpPr/>
+          <p:nvPr/>
+        </p:nvSpPr>
+        <p:spPr>
+          <a:xfrm>
+            <a:off x="11357517" y="4438403"/>
+            <a:ext cx="428625" cy="1797051"/>
+          </a:xfrm>
+          <a:prstGeom prst="rect">
+            <a:avLst/>
+          </a:prstGeom>
+          <a:solidFill>
+            <a:schemeClr val="accent2"/>
+          </a:solidFill>
+          <a:ln>
+            <a:noFill/>
+          </a:ln>
+        </p:spPr>
+        <p:style>
+          <a:lnRef idx="2">
+            <a:schemeClr val="accent1">
+              <a:shade val="50000"/>
+            </a:schemeClr>
+          </a:lnRef>
+          <a:fillRef idx="1">
+            <a:schemeClr val="accent1"/>
+          </a:fillRef>
+          <a:effectRef idx="0">
+            <a:schemeClr val="accent1"/>
+          </a:effectRef>
+          <a:fontRef idx="minor">
+            <a:schemeClr val="lt1"/>
+          </a:fontRef>
+        </p:style>
+        <p:txBody>
+          <a:bodyPr rtlCol="0" anchor="ctr"/>
+          <a:lstStyle/>
+          <a:p>
+            <a:pPr algn="ctr"/>
+            <a:endParaRPr lang="en-US"/>
+          </a:p>
+        </p:txBody>
+      </p:sp>
+      <p:cxnSp>
+        <p:nvCxnSpPr>
+          <p:cNvPr id="24" name="Conexão reta 23">
+            <a:extLst>
+              <a:ext uri="{FF2B5EF4-FFF2-40B4-BE49-F238E27FC236}">
+                <a16:creationId xmlns:a16="http://schemas.microsoft.com/office/drawing/2014/main" id="{23562E40-1267-4569-9704-79BC304FC021}"/>
+              </a:ext>
+            </a:extLst>
+          </p:cNvPr>
+          <p:cNvCxnSpPr>
+            <a:cxnSpLocks/>
+          </p:cNvCxnSpPr>
+          <p:nvPr/>
+        </p:nvCxnSpPr>
+        <p:spPr>
+          <a:xfrm flipV="1">
+            <a:off x="8413576" y="5049369"/>
+            <a:ext cx="1091075" cy="1151160"/>
+          </a:xfrm>
+          <a:prstGeom prst="line">
+            <a:avLst/>
+          </a:prstGeom>
+          <a:ln w="38100">
+            <a:solidFill>
+              <a:schemeClr val="tx1">
+                <a:lumMod val="50000"/>
+                <a:lumOff val="50000"/>
+              </a:schemeClr>
+            </a:solidFill>
+          </a:ln>
+        </p:spPr>
+        <p:style>
+          <a:lnRef idx="1">
+            <a:schemeClr val="dk1"/>
+          </a:lnRef>
+          <a:fillRef idx="0">
+            <a:schemeClr val="dk1"/>
+          </a:fillRef>
+          <a:effectRef idx="0">
+            <a:schemeClr val="dk1"/>
+          </a:effectRef>
+          <a:fontRef idx="minor">
+            <a:schemeClr val="tx1"/>
+          </a:fontRef>
+        </p:style>
+      </p:cxnSp>
+      <p:sp>
+        <p:nvSpPr>
+          <p:cNvPr id="37" name="Retângulo 36">
+            <a:extLst>
+              <a:ext uri="{FF2B5EF4-FFF2-40B4-BE49-F238E27FC236}">
+                <a16:creationId xmlns:a16="http://schemas.microsoft.com/office/drawing/2014/main" id="{D8F6AC16-5C92-449F-B5BF-02920999FE4A}"/>
+              </a:ext>
+            </a:extLst>
+          </p:cNvPr>
+          <p:cNvSpPr/>
+          <p:nvPr/>
+        </p:nvSpPr>
+        <p:spPr>
+          <a:xfrm>
+            <a:off x="9127214" y="5713165"/>
+            <a:ext cx="428625" cy="561295"/>
+          </a:xfrm>
+          <a:prstGeom prst="rect">
+            <a:avLst/>
+          </a:prstGeom>
+          <a:solidFill>
+            <a:srgbClr val="E07070"/>
+          </a:solidFill>
+          <a:ln>
+            <a:noFill/>
+          </a:ln>
+        </p:spPr>
+        <p:style>
+          <a:lnRef idx="2">
+            <a:schemeClr val="dk1">
+              <a:shade val="50000"/>
+            </a:schemeClr>
+          </a:lnRef>
+          <a:fillRef idx="1">
+            <a:schemeClr val="dk1"/>
+          </a:fillRef>
+          <a:effectRef idx="0">
+            <a:schemeClr val="dk1"/>
+          </a:effectRef>
+          <a:fontRef idx="minor">
+            <a:schemeClr val="lt1"/>
+          </a:fontRef>
+        </p:style>
+        <p:txBody>
+          <a:bodyPr rtlCol="0" anchor="ctr"/>
+          <a:lstStyle/>
+          <a:p>
+            <a:pPr algn="ctr"/>
+            <a:endParaRPr lang="en-US"/>
+          </a:p>
+        </p:txBody>
+      </p:sp>
+      <p:cxnSp>
+        <p:nvCxnSpPr>
+          <p:cNvPr id="38" name="Conexão reta 37">
+            <a:extLst>
+              <a:ext uri="{FF2B5EF4-FFF2-40B4-BE49-F238E27FC236}">
+                <a16:creationId xmlns:a16="http://schemas.microsoft.com/office/drawing/2014/main" id="{06FBFADE-BA78-46AB-898D-F144822BE784}"/>
+              </a:ext>
+            </a:extLst>
+          </p:cNvPr>
+          <p:cNvCxnSpPr>
+            <a:cxnSpLocks/>
+          </p:cNvCxnSpPr>
+          <p:nvPr/>
+        </p:nvCxnSpPr>
+        <p:spPr>
+          <a:xfrm flipV="1">
+            <a:off x="9491194" y="4984637"/>
+            <a:ext cx="1009537" cy="68264"/>
+          </a:xfrm>
+          <a:prstGeom prst="line">
+            <a:avLst/>
+          </a:prstGeom>
+          <a:ln w="38100">
+            <a:solidFill>
+              <a:schemeClr val="tx1">
+                <a:lumMod val="50000"/>
+                <a:lumOff val="50000"/>
+              </a:schemeClr>
+            </a:solidFill>
+          </a:ln>
+        </p:spPr>
+        <p:style>
+          <a:lnRef idx="1">
+            <a:schemeClr val="dk1"/>
+          </a:lnRef>
+          <a:fillRef idx="0">
+            <a:schemeClr val="dk1"/>
+          </a:fillRef>
+          <a:effectRef idx="0">
+            <a:schemeClr val="dk1"/>
+          </a:effectRef>
+          <a:fontRef idx="minor">
+            <a:schemeClr val="tx1"/>
+          </a:fontRef>
+        </p:style>
+      </p:cxnSp>
+      <p:cxnSp>
+        <p:nvCxnSpPr>
+          <p:cNvPr id="40" name="Conexão reta 39">
+            <a:extLst>
+              <a:ext uri="{FF2B5EF4-FFF2-40B4-BE49-F238E27FC236}">
+                <a16:creationId xmlns:a16="http://schemas.microsoft.com/office/drawing/2014/main" id="{50CC191B-BA8D-4143-94B7-71E499CF3812}"/>
+              </a:ext>
+            </a:extLst>
+          </p:cNvPr>
+          <p:cNvCxnSpPr>
+            <a:cxnSpLocks/>
+          </p:cNvCxnSpPr>
+          <p:nvPr/>
+        </p:nvCxnSpPr>
+        <p:spPr>
+          <a:xfrm>
+            <a:off x="10484506" y="4985386"/>
+            <a:ext cx="476147" cy="96696"/>
+          </a:xfrm>
+          <a:prstGeom prst="line">
+            <a:avLst/>
+          </a:prstGeom>
+          <a:ln w="38100">
+            <a:solidFill>
+              <a:schemeClr val="tx1">
+                <a:lumMod val="50000"/>
+                <a:lumOff val="50000"/>
+              </a:schemeClr>
+            </a:solidFill>
+          </a:ln>
+        </p:spPr>
+        <p:style>
+          <a:lnRef idx="1">
+            <a:schemeClr val="dk1"/>
+          </a:lnRef>
+          <a:fillRef idx="0">
+            <a:schemeClr val="dk1"/>
+          </a:fillRef>
+          <a:effectRef idx="0">
+            <a:schemeClr val="dk1"/>
+          </a:effectRef>
+          <a:fontRef idx="minor">
+            <a:schemeClr val="tx1"/>
+          </a:fontRef>
+        </p:style>
+      </p:cxnSp>
+      <p:cxnSp>
+        <p:nvCxnSpPr>
+          <p:cNvPr id="42" name="Conexão reta 41">
+            <a:extLst>
+              <a:ext uri="{FF2B5EF4-FFF2-40B4-BE49-F238E27FC236}">
+                <a16:creationId xmlns:a16="http://schemas.microsoft.com/office/drawing/2014/main" id="{6EB74CD9-D781-4681-8FC7-9725495D8FE2}"/>
+              </a:ext>
+            </a:extLst>
+          </p:cNvPr>
+          <p:cNvCxnSpPr>
+            <a:cxnSpLocks/>
+          </p:cNvCxnSpPr>
+          <p:nvPr/>
+        </p:nvCxnSpPr>
+        <p:spPr>
+          <a:xfrm flipV="1">
+            <a:off x="10936368" y="3828741"/>
+            <a:ext cx="537690" cy="1262148"/>
+          </a:xfrm>
+          <a:prstGeom prst="line">
+            <a:avLst/>
+          </a:prstGeom>
+          <a:ln w="38100">
+            <a:solidFill>
+              <a:schemeClr val="tx1">
+                <a:lumMod val="50000"/>
+                <a:lumOff val="50000"/>
+              </a:schemeClr>
+            </a:solidFill>
+          </a:ln>
+        </p:spPr>
+        <p:style>
+          <a:lnRef idx="1">
+            <a:schemeClr val="dk1"/>
+          </a:lnRef>
+          <a:fillRef idx="0">
+            <a:schemeClr val="dk1"/>
+          </a:fillRef>
+          <a:effectRef idx="0">
+            <a:schemeClr val="dk1"/>
+          </a:effectRef>
+          <a:fontRef idx="minor">
+            <a:schemeClr val="tx1"/>
+          </a:fontRef>
+        </p:style>
+      </p:cxnSp>
+      <p:cxnSp>
+        <p:nvCxnSpPr>
+          <p:cNvPr id="46" name="Conexão reta 45">
+            <a:extLst>
+              <a:ext uri="{FF2B5EF4-FFF2-40B4-BE49-F238E27FC236}">
+                <a16:creationId xmlns:a16="http://schemas.microsoft.com/office/drawing/2014/main" id="{F70A7998-6368-4001-8A2B-A2447E35B8FA}"/>
+              </a:ext>
+            </a:extLst>
+          </p:cNvPr>
+          <p:cNvCxnSpPr>
+            <a:cxnSpLocks/>
+          </p:cNvCxnSpPr>
+          <p:nvPr/>
+        </p:nvCxnSpPr>
+        <p:spPr>
+          <a:xfrm flipV="1">
+            <a:off x="11267769" y="3836615"/>
+            <a:ext cx="202531" cy="124960"/>
+          </a:xfrm>
+          <a:prstGeom prst="line">
+            <a:avLst/>
+          </a:prstGeom>
+          <a:ln w="38100">
+            <a:solidFill>
+              <a:schemeClr val="tx1">
+                <a:lumMod val="50000"/>
+                <a:lumOff val="50000"/>
+              </a:schemeClr>
+            </a:solidFill>
+          </a:ln>
+        </p:spPr>
+        <p:style>
+          <a:lnRef idx="1">
+            <a:schemeClr val="dk1"/>
+          </a:lnRef>
+          <a:fillRef idx="0">
+            <a:schemeClr val="dk1"/>
+          </a:fillRef>
+          <a:effectRef idx="0">
+            <a:schemeClr val="dk1"/>
+          </a:effectRef>
+          <a:fontRef idx="minor">
+            <a:schemeClr val="tx1"/>
+          </a:fontRef>
+        </p:style>
+      </p:cxnSp>
+      <p:cxnSp>
+        <p:nvCxnSpPr>
+          <p:cNvPr id="48" name="Conexão reta 47">
+            <a:extLst>
+              <a:ext uri="{FF2B5EF4-FFF2-40B4-BE49-F238E27FC236}">
+                <a16:creationId xmlns:a16="http://schemas.microsoft.com/office/drawing/2014/main" id="{7D182ED6-1755-41D7-91BD-A555591604D2}"/>
+              </a:ext>
+            </a:extLst>
+          </p:cNvPr>
+          <p:cNvCxnSpPr>
+            <a:cxnSpLocks/>
+          </p:cNvCxnSpPr>
+          <p:nvPr/>
+        </p:nvCxnSpPr>
+        <p:spPr>
+          <a:xfrm>
+            <a:off x="11470300" y="3836615"/>
+            <a:ext cx="27803" cy="238366"/>
+          </a:xfrm>
+          <a:prstGeom prst="line">
+            <a:avLst/>
+          </a:prstGeom>
+          <a:ln w="38100">
+            <a:solidFill>
+              <a:schemeClr val="tx1">
+                <a:lumMod val="50000"/>
+                <a:lumOff val="50000"/>
+              </a:schemeClr>
+            </a:solidFill>
+          </a:ln>
+        </p:spPr>
+        <p:style>
+          <a:lnRef idx="1">
+            <a:schemeClr val="dk1"/>
+          </a:lnRef>
+          <a:fillRef idx="0">
+            <a:schemeClr val="dk1"/>
+          </a:fillRef>
+          <a:effectRef idx="0">
+            <a:schemeClr val="dk1"/>
+          </a:effectRef>
+          <a:fontRef idx="minor">
+            <a:schemeClr val="tx1"/>
+          </a:fontRef>
+        </p:style>
+      </p:cxnSp>
+      <p:pic>
+        <p:nvPicPr>
+          <p:cNvPr id="1038" name="Picture 14" descr="Symbol Euro Icon | IconExperience - Professional Icons » O-Collection">
+            <a:extLst>
+              <a:ext uri="{FF2B5EF4-FFF2-40B4-BE49-F238E27FC236}">
+                <a16:creationId xmlns:a16="http://schemas.microsoft.com/office/drawing/2014/main" id="{F22DB503-98A0-4D32-A0AB-07C6CF9A0479}"/>
+              </a:ext>
+            </a:extLst>
+          </p:cNvPr>
+          <p:cNvPicPr>
+            <a:picLocks noChangeAspect="1" noChangeArrowheads="1"/>
+          </p:cNvPicPr>
+          <p:nvPr/>
+        </p:nvPicPr>
+        <p:blipFill>
+          <a:blip r:embed="rId3">
+            <a:alphaModFix amt="70000"/>
+            <a:extLst>
+              <a:ext uri="{28A0092B-C50C-407E-A947-70E740481C1C}">
+                <a14:useLocalDpi xmlns:a14="http://schemas.microsoft.com/office/drawing/2010/main" val="0"/>
+              </a:ext>
+            </a:extLst>
+          </a:blip>
+          <a:srcRect/>
+          <a:stretch>
+            <a:fillRect/>
+          </a:stretch>
+        </p:blipFill>
+        <p:spPr bwMode="auto">
+          <a:xfrm>
+            <a:off x="10557094" y="3352592"/>
+            <a:ext cx="682872" cy="682872"/>
+          </a:xfrm>
+          <a:prstGeom prst="rect">
+            <a:avLst/>
+          </a:prstGeom>
+          <a:noFill/>
+          <a:extLst>
+            <a:ext uri="{909E8E84-426E-40DD-AFC4-6F175D3DCCD1}">
+              <a14:hiddenFill xmlns:a14="http://schemas.microsoft.com/office/drawing/2010/main">
+                <a:solidFill>
+                  <a:srgbClr val="FFFFFF"/>
+                </a:solidFill>
+              </a14:hiddenFill>
+            </a:ext>
+          </a:extLst>
+        </p:spPr>
+      </p:pic>
     </p:spTree>
     <p:extLst>
       <p:ext uri="{BB962C8B-B14F-4D97-AF65-F5344CB8AC3E}">
@@ -12970,7 +13895,7 @@
                 <a:latin typeface="Aharoni" panose="02010803020104030203" pitchFamily="2" charset="-79"/>
                 <a:cs typeface="Aharoni" panose="02010803020104030203" pitchFamily="2" charset="-79"/>
               </a:rPr>
-              <a:t>Exemplo: USF Manuel Rocha Peixoto</a:t>
+              <a:t>Use Case: USF Manuel Rocha Peixoto</a:t>
             </a:r>
           </a:p>
         </p:txBody>

</xml_diff>